<commit_message>
Updated Static or Dynamic Slide. Using the one from those sections
</commit_message>
<xml_diff>
--- a/Trunk/Getting Started Material/DCAF Training/3 DCAF Components.pptx
+++ b/Trunk/Getting Started Material/DCAF Training/3 DCAF Components.pptx
@@ -5,7 +5,7 @@
     <p:sldMasterId id="2147483898" r:id="rId1"/>
   </p:sldMasterIdLst>
   <p:notesMasterIdLst>
-    <p:notesMasterId r:id="rId38"/>
+    <p:notesMasterId r:id="rId37"/>
   </p:notesMasterIdLst>
   <p:sldIdLst>
     <p:sldId id="259" r:id="rId2"/>
@@ -38,12 +38,11 @@
     <p:sldId id="342" r:id="rId29"/>
     <p:sldId id="324" r:id="rId30"/>
     <p:sldId id="378" r:id="rId31"/>
-    <p:sldId id="325" r:id="rId32"/>
-    <p:sldId id="380" r:id="rId33"/>
-    <p:sldId id="376" r:id="rId34"/>
-    <p:sldId id="333" r:id="rId35"/>
-    <p:sldId id="379" r:id="rId36"/>
-    <p:sldId id="261" r:id="rId37"/>
+    <p:sldId id="396" r:id="rId32"/>
+    <p:sldId id="376" r:id="rId33"/>
+    <p:sldId id="333" r:id="rId34"/>
+    <p:sldId id="379" r:id="rId35"/>
+    <p:sldId id="261" r:id="rId36"/>
   </p:sldIdLst>
   <p:sldSz cx="12192000" cy="6858000"/>
   <p:notesSz cx="6858000" cy="9144000"/>
@@ -5484,7 +5483,7 @@
           <a:p>
             <a:fld id="{07F34E27-2790-4C5E-95E0-B5DE5ED24B15}" type="datetimeFigureOut">
               <a:rPr lang="en-US" smtClean="0"/>
-              <a:t>2018-07-03</a:t>
+              <a:t>7/16/2018</a:t>
             </a:fld>
             <a:endParaRPr lang="en-US"/>
           </a:p>
@@ -6541,7 +6540,7 @@
           <a:p>
             <a:fld id="{E78E71CD-9786-4621-AA97-B53C62C3E534}" type="slidenum">
               <a:rPr lang="en-US" smtClean="0"/>
-              <a:t>33</a:t>
+              <a:t>32</a:t>
             </a:fld>
             <a:endParaRPr lang="en-US"/>
           </a:p>
@@ -6625,7 +6624,7 @@
           <a:p>
             <a:fld id="{851B3976-BA5C-4172-B420-FFE6D6004C76}" type="slidenum">
               <a:rPr lang="en-US" smtClean="0"/>
-              <a:t>36</a:t>
+              <a:t>35</a:t>
             </a:fld>
             <a:endParaRPr lang="en-US" dirty="0"/>
           </a:p>
@@ -10824,7 +10823,7 @@
           <a:p>
             <a:fld id="{352AF116-C4F1-40C7-B0A7-E9F919C6FA99}" type="datetimeFigureOut">
               <a:rPr lang="en-US" smtClean="0"/>
-              <a:t>2018-07-03</a:t>
+              <a:t>7/16/2018</a:t>
             </a:fld>
             <a:endParaRPr lang="en-US"/>
           </a:p>
@@ -11751,7 +11750,7 @@
           <a:p>
             <a:fld id="{1EAA415B-8007-489A-BDE4-6C1DCF92BB48}" type="datetimeFigureOut">
               <a:rPr lang="en-US" smtClean="0"/>
-              <a:t>2018-07-03</a:t>
+              <a:t>7/16/2018</a:t>
             </a:fld>
             <a:endParaRPr lang="en-US"/>
           </a:p>
@@ -27748,7 +27747,13 @@
       </p:grpSpPr>
       <p:sp>
         <p:nvSpPr>
-          <p:cNvPr id="2" name="Title 1"/>
+          <p:cNvPr id="2" name="Title 1">
+            <a:extLst>
+              <a:ext uri="{FF2B5EF4-FFF2-40B4-BE49-F238E27FC236}">
+                <a16:creationId xmlns:a16="http://schemas.microsoft.com/office/drawing/2014/main" id="{CC7A9EF6-01ED-439F-A409-094DCB43CB99}"/>
+              </a:ext>
+            </a:extLst>
+          </p:cNvPr>
           <p:cNvSpPr>
             <a:spLocks noGrp="1"/>
           </p:cNvSpPr>
@@ -27763,24 +27768,25 @@
           <a:p>
             <a:r>
               <a:rPr lang="en-US" dirty="0"/>
-              <a:t>Static</a:t>
-            </a:r>
-            <a:r>
-              <a:rPr lang="en-US" baseline="0" dirty="0"/>
-              <a:t> Module</a:t>
-            </a:r>
-            <a:endParaRPr lang="en-US" dirty="0"/>
-          </a:p>
-        </p:txBody>
-      </p:sp>
-      <p:sp>
-        <p:nvSpPr>
-          <p:cNvPr id="3" name="Content Placeholder 2"/>
+              <a:t>Static or Dynamic</a:t>
+            </a:r>
+          </a:p>
+        </p:txBody>
+      </p:sp>
+      <p:sp>
+        <p:nvSpPr>
+          <p:cNvPr id="3" name="Content Placeholder 2">
+            <a:extLst>
+              <a:ext uri="{FF2B5EF4-FFF2-40B4-BE49-F238E27FC236}">
+                <a16:creationId xmlns:a16="http://schemas.microsoft.com/office/drawing/2014/main" id="{3146A820-0D89-4021-9026-5C705BA35C18}"/>
+              </a:ext>
+            </a:extLst>
+          </p:cNvPr>
           <p:cNvSpPr>
             <a:spLocks noGrp="1"/>
           </p:cNvSpPr>
           <p:nvPr>
-            <p:ph idx="1"/>
+            <p:ph sz="half" idx="1"/>
           </p:nvPr>
         </p:nvSpPr>
         <p:spPr/>
@@ -27788,97 +27794,118 @@
           <a:bodyPr/>
           <a:lstStyle/>
           <a:p>
+            <a:pPr marL="365751" lvl="1" indent="0">
+              <a:buNone/>
+            </a:pPr>
+            <a:r>
+              <a:rPr lang="en-US" b="1" u="sng" dirty="0"/>
+              <a:t>Static</a:t>
+            </a:r>
+          </a:p>
+          <a:p>
+            <a:pPr lvl="1"/>
             <a:r>
               <a:rPr lang="en-US" dirty="0"/>
-              <a:t>Configuration</a:t>
-            </a:r>
-            <a:r>
-              <a:rPr lang="en-US" baseline="0" dirty="0"/>
-              <a:t> Class:</a:t>
+              <a:t>Module developer defines the number of channels available in the module</a:t>
             </a:r>
           </a:p>
           <a:p>
             <a:pPr lvl="1"/>
             <a:r>
               <a:rPr lang="en-US" dirty="0"/>
-              <a:t>Select module options (number of instances, allowable</a:t>
-            </a:r>
-            <a:r>
-              <a:rPr lang="en-US" baseline="0" dirty="0"/>
-              <a:t> targets)</a:t>
+              <a:t>Template includes UI ready to use.</a:t>
             </a:r>
           </a:p>
           <a:p>
             <a:pPr lvl="1"/>
             <a:r>
-              <a:rPr lang="en-US" baseline="0" dirty="0"/>
-              <a:t>Update validate.vi with validation rules</a:t>
+              <a:rPr lang="en-US" dirty="0"/>
+              <a:t>Easier to Create</a:t>
             </a:r>
           </a:p>
           <a:p>
             <a:pPr lvl="1"/>
             <a:r>
-              <a:rPr lang="en-US" baseline="0" dirty="0"/>
-              <a:t>Update get default error list.vi</a:t>
-            </a:r>
-            <a:r>
               <a:rPr lang="en-US" dirty="0"/>
-              <a:t> with </a:t>
-            </a:r>
-            <a:r>
-              <a:rPr lang="en-US" baseline="0" dirty="0"/>
-              <a:t>default error classifications</a:t>
-            </a:r>
-          </a:p>
-          <a:p>
-            <a:pPr lvl="0"/>
-            <a:r>
-              <a:rPr lang="en-US" dirty="0"/>
-              <a:t>Editor Class:</a:t>
-            </a:r>
-          </a:p>
-          <a:p>
-            <a:pPr lvl="1"/>
-            <a:r>
-              <a:rPr lang="en-US" dirty="0"/>
-              <a:t>Select module glyph</a:t>
-            </a:r>
-          </a:p>
-          <a:p>
-            <a:pPr lvl="0"/>
-            <a:r>
-              <a:rPr lang="en-US" dirty="0"/>
-              <a:t>Runtime</a:t>
-            </a:r>
-          </a:p>
-          <a:p>
-            <a:pPr lvl="1"/>
-            <a:r>
-              <a:rPr lang="en-US" dirty="0"/>
-              <a:t>Implement User Input.vi,</a:t>
-            </a:r>
-            <a:r>
-              <a:rPr lang="en-US" baseline="0" dirty="0"/>
-              <a:t> User Process.vi, and/or User Output.vi with custom logic</a:t>
-            </a:r>
-            <a:endParaRPr lang="en-US" dirty="0"/>
-          </a:p>
-          <a:p>
-            <a:pPr lvl="1"/>
-            <a:endParaRPr lang="en-US" dirty="0"/>
-          </a:p>
-          <a:p>
-            <a:pPr lvl="1"/>
-            <a:endParaRPr lang="en-US" dirty="0"/>
-          </a:p>
-        </p:txBody>
-      </p:sp>
-      <p:sp>
-        <p:nvSpPr>
-          <p:cNvPr id="9" name="Rounded Rectangle 6">
+              <a:t>Mostly used for processing</a:t>
+            </a:r>
+          </a:p>
+        </p:txBody>
+      </p:sp>
+      <p:sp>
+        <p:nvSpPr>
+          <p:cNvPr id="4" name="Content Placeholder 3">
             <a:extLst>
               <a:ext uri="{FF2B5EF4-FFF2-40B4-BE49-F238E27FC236}">
-                <a16:creationId xmlns:a16="http://schemas.microsoft.com/office/drawing/2014/main" id="{4F54AE16-44B1-4554-824D-CFFFBAB89907}"/>
+                <a16:creationId xmlns:a16="http://schemas.microsoft.com/office/drawing/2014/main" id="{47E18519-E607-4692-8264-4058E09C741B}"/>
+              </a:ext>
+            </a:extLst>
+          </p:cNvPr>
+          <p:cNvSpPr>
+            <a:spLocks noGrp="1"/>
+          </p:cNvSpPr>
+          <p:nvPr>
+            <p:ph sz="half" idx="2"/>
+          </p:nvPr>
+        </p:nvSpPr>
+        <p:spPr/>
+        <p:txBody>
+          <a:bodyPr/>
+          <a:lstStyle/>
+          <a:p>
+            <a:r>
+              <a:rPr lang="en-US" b="1" u="sng" dirty="0"/>
+              <a:t>Dynamic</a:t>
+            </a:r>
+          </a:p>
+          <a:p>
+            <a:pPr marL="342900" indent="-342900">
+              <a:buFont typeface="Arial" panose="020B0604020202020204" pitchFamily="34" charset="0"/>
+              <a:buChar char="•"/>
+            </a:pPr>
+            <a:r>
+              <a:rPr lang="en-US" dirty="0"/>
+              <a:t>Final user can configure the number of channels. </a:t>
+            </a:r>
+          </a:p>
+          <a:p>
+            <a:pPr marL="342900" indent="-342900">
+              <a:buFont typeface="Arial" panose="020B0604020202020204" pitchFamily="34" charset="0"/>
+              <a:buChar char="•"/>
+            </a:pPr>
+            <a:r>
+              <a:rPr lang="en-US" dirty="0"/>
+              <a:t>More flexible template</a:t>
+            </a:r>
+          </a:p>
+          <a:p>
+            <a:pPr marL="342900" indent="-342900">
+              <a:buFont typeface="Arial" panose="020B0604020202020204" pitchFamily="34" charset="0"/>
+              <a:buChar char="•"/>
+            </a:pPr>
+            <a:r>
+              <a:rPr lang="en-US" dirty="0"/>
+              <a:t>Requires more codding. </a:t>
+            </a:r>
+          </a:p>
+          <a:p>
+            <a:pPr marL="342900" indent="-342900">
+              <a:buFont typeface="Arial" panose="020B0604020202020204" pitchFamily="34" charset="0"/>
+              <a:buChar char="•"/>
+            </a:pPr>
+            <a:r>
+              <a:rPr lang="en-US" dirty="0"/>
+              <a:t>More commonly used for input/output</a:t>
+            </a:r>
+          </a:p>
+        </p:txBody>
+      </p:sp>
+      <p:sp>
+        <p:nvSpPr>
+          <p:cNvPr id="5" name="Rounded Rectangle 6">
+            <a:extLst>
+              <a:ext uri="{FF2B5EF4-FFF2-40B4-BE49-F238E27FC236}">
+                <a16:creationId xmlns:a16="http://schemas.microsoft.com/office/drawing/2014/main" id="{06435B48-8031-4422-8F8C-DBF389D1524A}"/>
               </a:ext>
             </a:extLst>
           </p:cNvPr>
@@ -27939,10 +27966,10 @@
       </p:sp>
       <p:sp>
         <p:nvSpPr>
-          <p:cNvPr id="10" name="Rounded Rectangle 7">
+          <p:cNvPr id="6" name="Rounded Rectangle 7">
             <a:extLst>
               <a:ext uri="{FF2B5EF4-FFF2-40B4-BE49-F238E27FC236}">
-                <a16:creationId xmlns:a16="http://schemas.microsoft.com/office/drawing/2014/main" id="{08452B97-F825-4E8D-A4C0-F39D117D2D4D}"/>
+                <a16:creationId xmlns:a16="http://schemas.microsoft.com/office/drawing/2014/main" id="{8294D36D-293B-4D6A-AF0C-8A1C641C7452}"/>
               </a:ext>
             </a:extLst>
           </p:cNvPr>
@@ -28003,10 +28030,10 @@
       </p:sp>
       <p:sp>
         <p:nvSpPr>
-          <p:cNvPr id="11" name="Rounded Rectangle 3">
+          <p:cNvPr id="7" name="Rounded Rectangle 3">
             <a:extLst>
               <a:ext uri="{FF2B5EF4-FFF2-40B4-BE49-F238E27FC236}">
-                <a16:creationId xmlns:a16="http://schemas.microsoft.com/office/drawing/2014/main" id="{31FF8391-228A-46C6-98CB-3A385AC4B253}"/>
+                <a16:creationId xmlns:a16="http://schemas.microsoft.com/office/drawing/2014/main" id="{F6A8A979-D213-44C3-89C4-DD7D9EFD7512}"/>
               </a:ext>
             </a:extLst>
           </p:cNvPr>
@@ -28067,10 +28094,10 @@
       </p:sp>
       <p:sp>
         <p:nvSpPr>
-          <p:cNvPr id="12" name="Rounded Rectangle 5">
+          <p:cNvPr id="8" name="Rounded Rectangle 5">
             <a:extLst>
               <a:ext uri="{FF2B5EF4-FFF2-40B4-BE49-F238E27FC236}">
-                <a16:creationId xmlns:a16="http://schemas.microsoft.com/office/drawing/2014/main" id="{CA94C8AD-C2BB-45CE-A845-F389FA7DEA1A}"/>
+                <a16:creationId xmlns:a16="http://schemas.microsoft.com/office/drawing/2014/main" id="{C8E29261-4C68-4294-B4C0-B35F25883685}"/>
               </a:ext>
             </a:extLst>
           </p:cNvPr>
@@ -28132,10 +28159,10 @@
       </p:sp>
       <p:sp>
         <p:nvSpPr>
-          <p:cNvPr id="13" name="Rounded Rectangle 4">
+          <p:cNvPr id="9" name="Rounded Rectangle 4">
             <a:extLst>
               <a:ext uri="{FF2B5EF4-FFF2-40B4-BE49-F238E27FC236}">
-                <a16:creationId xmlns:a16="http://schemas.microsoft.com/office/drawing/2014/main" id="{F26FCBAA-D2B4-4B18-9F51-DEDD657C291E}"/>
+                <a16:creationId xmlns:a16="http://schemas.microsoft.com/office/drawing/2014/main" id="{23833B85-347B-4AC3-BF80-8967C786F20E}"/>
               </a:ext>
             </a:extLst>
           </p:cNvPr>
@@ -28197,7 +28224,7 @@
     </p:spTree>
     <p:extLst>
       <p:ext uri="{BB962C8B-B14F-4D97-AF65-F5344CB8AC3E}">
-        <p14:creationId xmlns:p14="http://schemas.microsoft.com/office/powerpoint/2010/main" val="2715638149"/>
+        <p14:creationId xmlns:p14="http://schemas.microsoft.com/office/powerpoint/2010/main" val="1614737501"/>
       </p:ext>
     </p:extLst>
   </p:cSld>
@@ -28226,12 +28253,18 @@
       </p:grpSpPr>
       <p:sp>
         <p:nvSpPr>
-          <p:cNvPr id="2" name="Title 1"/>
+          <p:cNvPr id="3" name="Text Placeholder 2">
+            <a:extLst>
+              <a:ext uri="{FF2B5EF4-FFF2-40B4-BE49-F238E27FC236}">
+                <a16:creationId xmlns:a16="http://schemas.microsoft.com/office/drawing/2014/main" id="{D346678E-61AD-4F84-9755-BD10F72A5D75}"/>
+              </a:ext>
+            </a:extLst>
+          </p:cNvPr>
           <p:cNvSpPr>
             <a:spLocks noGrp="1"/>
           </p:cNvSpPr>
           <p:nvPr>
-            <p:ph type="title"/>
+            <p:ph type="body" sz="quarter" idx="10"/>
           </p:nvPr>
         </p:nvSpPr>
         <p:spPr/>
@@ -28241,381 +28274,7 @@
           <a:p>
             <a:r>
               <a:rPr lang="en-US" dirty="0"/>
-              <a:t>Dynamic</a:t>
-            </a:r>
-            <a:r>
-              <a:rPr lang="en-US" baseline="0" dirty="0"/>
-              <a:t> Module</a:t>
-            </a:r>
-            <a:endParaRPr lang="en-US" dirty="0"/>
-          </a:p>
-        </p:txBody>
-      </p:sp>
-      <p:sp>
-        <p:nvSpPr>
-          <p:cNvPr id="3" name="Content Placeholder 2"/>
-          <p:cNvSpPr>
-            <a:spLocks noGrp="1"/>
-          </p:cNvSpPr>
-          <p:nvPr>
-            <p:ph idx="1"/>
-          </p:nvPr>
-        </p:nvSpPr>
-        <p:spPr/>
-        <p:txBody>
-          <a:bodyPr/>
-          <a:lstStyle/>
-          <a:p>
-            <a:r>
-              <a:rPr lang="en-US" dirty="0"/>
-              <a:t>Configuration</a:t>
-            </a:r>
-            <a:r>
-              <a:rPr lang="en-US" baseline="0" dirty="0"/>
-              <a:t> Class:</a:t>
-            </a:r>
-          </a:p>
-          <a:p>
-            <a:pPr lvl="0"/>
-            <a:r>
-              <a:rPr lang="en-US" dirty="0"/>
-              <a:t>Editor Class:</a:t>
-            </a:r>
-          </a:p>
-          <a:p>
-            <a:pPr lvl="0"/>
-            <a:r>
-              <a:rPr lang="en-US" dirty="0"/>
-              <a:t>Runtime</a:t>
-            </a:r>
-          </a:p>
-          <a:p>
-            <a:pPr lvl="1"/>
-            <a:endParaRPr lang="en-US" dirty="0"/>
-          </a:p>
-          <a:p>
-            <a:pPr lvl="1"/>
-            <a:endParaRPr lang="en-US" dirty="0"/>
-          </a:p>
-        </p:txBody>
-      </p:sp>
-      <p:sp>
-        <p:nvSpPr>
-          <p:cNvPr id="9" name="Rounded Rectangle 6">
-            <a:extLst>
-              <a:ext uri="{FF2B5EF4-FFF2-40B4-BE49-F238E27FC236}">
-                <a16:creationId xmlns:a16="http://schemas.microsoft.com/office/drawing/2014/main" id="{C55B5A04-1C12-43D2-9183-DE0F970B8AD1}"/>
-              </a:ext>
-            </a:extLst>
-          </p:cNvPr>
-          <p:cNvSpPr/>
-          <p:nvPr/>
-        </p:nvSpPr>
-        <p:spPr>
-          <a:xfrm>
-            <a:off x="8831716" y="5564020"/>
-            <a:ext cx="1405593" cy="1157682"/>
-          </a:xfrm>
-          <a:prstGeom prst="roundRect">
-            <a:avLst/>
-          </a:prstGeom>
-          <a:solidFill>
-            <a:schemeClr val="bg1">
-              <a:lumMod val="85000"/>
-            </a:schemeClr>
-          </a:solidFill>
-          <a:ln w="28575">
-            <a:solidFill>
-              <a:schemeClr val="tx1"/>
-            </a:solidFill>
-          </a:ln>
-          <a:effectLst>
-            <a:outerShdw blurRad="50800" dist="38100" dir="2700000" algn="tl" rotWithShape="0">
-              <a:prstClr val="black">
-                <a:alpha val="40000"/>
-              </a:prstClr>
-            </a:outerShdw>
-          </a:effectLst>
-        </p:spPr>
-        <p:style>
-          <a:lnRef idx="1">
-            <a:schemeClr val="accent1"/>
-          </a:lnRef>
-          <a:fillRef idx="3">
-            <a:schemeClr val="accent1"/>
-          </a:fillRef>
-          <a:effectRef idx="2">
-            <a:schemeClr val="accent1"/>
-          </a:effectRef>
-          <a:fontRef idx="minor">
-            <a:schemeClr val="lt1"/>
-          </a:fontRef>
-        </p:style>
-        <p:txBody>
-          <a:bodyPr rtlCol="0" anchor="t" anchorCtr="0"/>
-          <a:lstStyle/>
-          <a:p>
-            <a:endParaRPr lang="en-US" b="1" dirty="0">
-              <a:solidFill>
-                <a:schemeClr val="tx1"/>
-              </a:solidFill>
-            </a:endParaRPr>
-          </a:p>
-        </p:txBody>
-      </p:sp>
-      <p:sp>
-        <p:nvSpPr>
-          <p:cNvPr id="10" name="Rounded Rectangle 7">
-            <a:extLst>
-              <a:ext uri="{FF2B5EF4-FFF2-40B4-BE49-F238E27FC236}">
-                <a16:creationId xmlns:a16="http://schemas.microsoft.com/office/drawing/2014/main" id="{59FC683F-42A7-40E4-BC41-7209478653AA}"/>
-              </a:ext>
-            </a:extLst>
-          </p:cNvPr>
-          <p:cNvSpPr/>
-          <p:nvPr/>
-        </p:nvSpPr>
-        <p:spPr>
-          <a:xfrm>
-            <a:off x="10619041" y="5564020"/>
-            <a:ext cx="1405593" cy="1157682"/>
-          </a:xfrm>
-          <a:prstGeom prst="roundRect">
-            <a:avLst/>
-          </a:prstGeom>
-          <a:solidFill>
-            <a:schemeClr val="bg1">
-              <a:lumMod val="85000"/>
-            </a:schemeClr>
-          </a:solidFill>
-          <a:ln w="28575">
-            <a:solidFill>
-              <a:schemeClr val="tx1"/>
-            </a:solidFill>
-          </a:ln>
-          <a:effectLst>
-            <a:outerShdw blurRad="50800" dist="38100" dir="2700000" algn="tl" rotWithShape="0">
-              <a:prstClr val="black">
-                <a:alpha val="40000"/>
-              </a:prstClr>
-            </a:outerShdw>
-          </a:effectLst>
-        </p:spPr>
-        <p:style>
-          <a:lnRef idx="1">
-            <a:schemeClr val="accent1"/>
-          </a:lnRef>
-          <a:fillRef idx="3">
-            <a:schemeClr val="accent1"/>
-          </a:fillRef>
-          <a:effectRef idx="2">
-            <a:schemeClr val="accent1"/>
-          </a:effectRef>
-          <a:fontRef idx="minor">
-            <a:schemeClr val="lt1"/>
-          </a:fontRef>
-        </p:style>
-        <p:txBody>
-          <a:bodyPr rtlCol="0" anchor="t" anchorCtr="0"/>
-          <a:lstStyle/>
-          <a:p>
-            <a:endParaRPr lang="en-US" b="1" dirty="0">
-              <a:solidFill>
-                <a:schemeClr val="tx1"/>
-              </a:solidFill>
-            </a:endParaRPr>
-          </a:p>
-        </p:txBody>
-      </p:sp>
-      <p:sp>
-        <p:nvSpPr>
-          <p:cNvPr id="11" name="Rounded Rectangle 3">
-            <a:extLst>
-              <a:ext uri="{FF2B5EF4-FFF2-40B4-BE49-F238E27FC236}">
-                <a16:creationId xmlns:a16="http://schemas.microsoft.com/office/drawing/2014/main" id="{7CD17A4F-1EF0-405A-BF6A-2F0C19BD0489}"/>
-              </a:ext>
-            </a:extLst>
-          </p:cNvPr>
-          <p:cNvSpPr/>
-          <p:nvPr/>
-        </p:nvSpPr>
-        <p:spPr>
-          <a:xfrm>
-            <a:off x="10784375" y="5790808"/>
-            <a:ext cx="1074926" cy="222063"/>
-          </a:xfrm>
-          <a:prstGeom prst="roundRect">
-            <a:avLst/>
-          </a:prstGeom>
-          <a:solidFill>
-            <a:srgbClr val="C00000">
-              <a:alpha val="20000"/>
-            </a:srgbClr>
-          </a:solidFill>
-          <a:ln w="28575">
-            <a:solidFill>
-              <a:schemeClr val="tx1"/>
-            </a:solidFill>
-          </a:ln>
-          <a:effectLst>
-            <a:outerShdw blurRad="50800" dist="38100" dir="2700000" algn="tl" rotWithShape="0">
-              <a:prstClr val="black">
-                <a:alpha val="40000"/>
-              </a:prstClr>
-            </a:outerShdw>
-          </a:effectLst>
-        </p:spPr>
-        <p:style>
-          <a:lnRef idx="1">
-            <a:schemeClr val="accent1"/>
-          </a:lnRef>
-          <a:fillRef idx="3">
-            <a:schemeClr val="accent1"/>
-          </a:fillRef>
-          <a:effectRef idx="2">
-            <a:schemeClr val="accent1"/>
-          </a:effectRef>
-          <a:fontRef idx="minor">
-            <a:schemeClr val="lt1"/>
-          </a:fontRef>
-        </p:style>
-        <p:txBody>
-          <a:bodyPr rtlCol="0" anchor="ctr"/>
-          <a:lstStyle/>
-          <a:p>
-            <a:pPr algn="ctr"/>
-            <a:r>
-              <a:rPr lang="en-US" dirty="0"/>
-              <a:t>Engine</a:t>
-            </a:r>
-          </a:p>
-        </p:txBody>
-      </p:sp>
-      <p:sp>
-        <p:nvSpPr>
-          <p:cNvPr id="12" name="Rounded Rectangle 5">
-            <a:extLst>
-              <a:ext uri="{FF2B5EF4-FFF2-40B4-BE49-F238E27FC236}">
-                <a16:creationId xmlns:a16="http://schemas.microsoft.com/office/drawing/2014/main" id="{79253B03-A6D8-4A73-A9A6-C465767498E5}"/>
-              </a:ext>
-            </a:extLst>
-          </p:cNvPr>
-          <p:cNvSpPr/>
-          <p:nvPr/>
-        </p:nvSpPr>
-        <p:spPr>
-          <a:xfrm>
-            <a:off x="9015238" y="5790808"/>
-            <a:ext cx="1038549" cy="229913"/>
-          </a:xfrm>
-          <a:prstGeom prst="roundRect">
-            <a:avLst/>
-          </a:prstGeom>
-          <a:solidFill>
-            <a:schemeClr val="accent3">
-              <a:lumMod val="50000"/>
-              <a:alpha val="20000"/>
-            </a:schemeClr>
-          </a:solidFill>
-          <a:ln w="28575">
-            <a:solidFill>
-              <a:schemeClr val="tx1"/>
-            </a:solidFill>
-          </a:ln>
-          <a:effectLst>
-            <a:outerShdw blurRad="50800" dist="38100" dir="2700000" algn="tl" rotWithShape="0">
-              <a:prstClr val="black">
-                <a:alpha val="40000"/>
-              </a:prstClr>
-            </a:outerShdw>
-          </a:effectLst>
-        </p:spPr>
-        <p:style>
-          <a:lnRef idx="1">
-            <a:schemeClr val="accent1"/>
-          </a:lnRef>
-          <a:fillRef idx="3">
-            <a:schemeClr val="accent1"/>
-          </a:fillRef>
-          <a:effectRef idx="2">
-            <a:schemeClr val="accent1"/>
-          </a:effectRef>
-          <a:fontRef idx="minor">
-            <a:schemeClr val="lt1"/>
-          </a:fontRef>
-        </p:style>
-        <p:txBody>
-          <a:bodyPr rtlCol="0" anchor="ctr"/>
-          <a:lstStyle/>
-          <a:p>
-            <a:pPr algn="ctr"/>
-            <a:r>
-              <a:rPr lang="en-US" dirty="0"/>
-              <a:t>Editor</a:t>
-            </a:r>
-          </a:p>
-        </p:txBody>
-      </p:sp>
-      <p:sp>
-        <p:nvSpPr>
-          <p:cNvPr id="13" name="Rounded Rectangle 4">
-            <a:extLst>
-              <a:ext uri="{FF2B5EF4-FFF2-40B4-BE49-F238E27FC236}">
-                <a16:creationId xmlns:a16="http://schemas.microsoft.com/office/drawing/2014/main" id="{847FD233-0894-437C-ABC2-29FFBF350DD9}"/>
-              </a:ext>
-            </a:extLst>
-          </p:cNvPr>
-          <p:cNvSpPr/>
-          <p:nvPr/>
-        </p:nvSpPr>
-        <p:spPr>
-          <a:xfrm>
-            <a:off x="9047922" y="6316178"/>
-            <a:ext cx="2760506" cy="229913"/>
-          </a:xfrm>
-          <a:prstGeom prst="roundRect">
-            <a:avLst/>
-          </a:prstGeom>
-          <a:solidFill>
-            <a:schemeClr val="tx2">
-              <a:lumMod val="50000"/>
-            </a:schemeClr>
-          </a:solidFill>
-          <a:ln w="28575">
-            <a:solidFill>
-              <a:schemeClr val="tx1"/>
-            </a:solidFill>
-          </a:ln>
-          <a:effectLst>
-            <a:outerShdw blurRad="50800" dist="38100" dir="2700000" algn="tl" rotWithShape="0">
-              <a:prstClr val="black">
-                <a:alpha val="40000"/>
-              </a:prstClr>
-            </a:outerShdw>
-          </a:effectLst>
-        </p:spPr>
-        <p:style>
-          <a:lnRef idx="1">
-            <a:schemeClr val="accent1"/>
-          </a:lnRef>
-          <a:fillRef idx="3">
-            <a:schemeClr val="accent1"/>
-          </a:fillRef>
-          <a:effectRef idx="2">
-            <a:schemeClr val="accent1"/>
-          </a:effectRef>
-          <a:fontRef idx="minor">
-            <a:schemeClr val="lt1"/>
-          </a:fontRef>
-        </p:style>
-        <p:txBody>
-          <a:bodyPr rtlCol="0" anchor="ctr"/>
-          <a:lstStyle/>
-          <a:p>
-            <a:pPr algn="ctr"/>
-            <a:r>
-              <a:rPr lang="en-US" dirty="0"/>
-              <a:t>Modules</a:t>
+              <a:t>Configuration Editor</a:t>
             </a:r>
           </a:p>
         </p:txBody>
@@ -28623,7 +28282,7 @@
     </p:spTree>
     <p:extLst>
       <p:ext uri="{BB962C8B-B14F-4D97-AF65-F5344CB8AC3E}">
-        <p14:creationId xmlns:p14="http://schemas.microsoft.com/office/powerpoint/2010/main" val="1767969810"/>
+        <p14:creationId xmlns:p14="http://schemas.microsoft.com/office/powerpoint/2010/main" val="2524145622"/>
       </p:ext>
     </p:extLst>
   </p:cSld>
@@ -28652,64 +28311,6 @@
       </p:grpSpPr>
       <p:sp>
         <p:nvSpPr>
-          <p:cNvPr id="3" name="Text Placeholder 2">
-            <a:extLst>
-              <a:ext uri="{FF2B5EF4-FFF2-40B4-BE49-F238E27FC236}">
-                <a16:creationId xmlns:a16="http://schemas.microsoft.com/office/drawing/2014/main" id="{D346678E-61AD-4F84-9755-BD10F72A5D75}"/>
-              </a:ext>
-            </a:extLst>
-          </p:cNvPr>
-          <p:cNvSpPr>
-            <a:spLocks noGrp="1"/>
-          </p:cNvSpPr>
-          <p:nvPr>
-            <p:ph type="body" sz="quarter" idx="10"/>
-          </p:nvPr>
-        </p:nvSpPr>
-        <p:spPr/>
-        <p:txBody>
-          <a:bodyPr/>
-          <a:lstStyle/>
-          <a:p>
-            <a:r>
-              <a:rPr lang="en-US" dirty="0"/>
-              <a:t>Configuration Editor</a:t>
-            </a:r>
-          </a:p>
-        </p:txBody>
-      </p:sp>
-    </p:spTree>
-    <p:extLst>
-      <p:ext uri="{BB962C8B-B14F-4D97-AF65-F5344CB8AC3E}">
-        <p14:creationId xmlns:p14="http://schemas.microsoft.com/office/powerpoint/2010/main" val="2524145622"/>
-      </p:ext>
-    </p:extLst>
-  </p:cSld>
-  <p:clrMapOvr>
-    <a:masterClrMapping/>
-  </p:clrMapOvr>
-</p:sld>
-</file>
-
-<file path=ppt/slides/slide34.xml><?xml version="1.0" encoding="utf-8"?>
-<p:sld xmlns:a="http://schemas.openxmlformats.org/drawingml/2006/main" xmlns:r="http://schemas.openxmlformats.org/officeDocument/2006/relationships" xmlns:p="http://schemas.openxmlformats.org/presentationml/2006/main">
-  <p:cSld>
-    <p:spTree>
-      <p:nvGrpSpPr>
-        <p:cNvPr id="1" name=""/>
-        <p:cNvGrpSpPr/>
-        <p:nvPr/>
-      </p:nvGrpSpPr>
-      <p:grpSpPr>
-        <a:xfrm>
-          <a:off x="0" y="0"/>
-          <a:ext cx="0" cy="0"/>
-          <a:chOff x="0" y="0"/>
-          <a:chExt cx="0" cy="0"/>
-        </a:xfrm>
-      </p:grpSpPr>
-      <p:sp>
-        <p:nvSpPr>
           <p:cNvPr id="2" name="Title 1"/>
           <p:cNvSpPr>
             <a:spLocks noGrp="1"/>
@@ -29130,7 +28731,7 @@
 </p:sld>
 </file>
 
-<file path=ppt/slides/slide35.xml><?xml version="1.0" encoding="utf-8"?>
+<file path=ppt/slides/slide34.xml><?xml version="1.0" encoding="utf-8"?>
 <p:sld xmlns:a="http://schemas.openxmlformats.org/drawingml/2006/main" xmlns:r="http://schemas.openxmlformats.org/officeDocument/2006/relationships" xmlns:p="http://schemas.openxmlformats.org/presentationml/2006/main">
   <p:cSld>
     <p:spTree>
@@ -29538,7 +29139,7 @@
 </p:sld>
 </file>
 
-<file path=ppt/slides/slide36.xml><?xml version="1.0" encoding="utf-8"?>
+<file path=ppt/slides/slide35.xml><?xml version="1.0" encoding="utf-8"?>
 <p:sld xmlns:a="http://schemas.openxmlformats.org/drawingml/2006/main" xmlns:r="http://schemas.openxmlformats.org/officeDocument/2006/relationships" xmlns:p="http://schemas.openxmlformats.org/presentationml/2006/main">
   <p:cSld>
     <p:spTree>

</xml_diff>